<commit_message>
Finished process map + detected errors in word document, pending to fix
</commit_message>
<xml_diff>
--- a/Mapa_de_procesos.pptx
+++ b/Mapa_de_procesos.pptx
@@ -2765,9 +2765,14 @@
 <p:sldMaster xmlns:a="http://schemas.openxmlformats.org/drawingml/2006/main" xmlns:r="http://schemas.openxmlformats.org/officeDocument/2006/relationships" xmlns:p="http://schemas.openxmlformats.org/presentationml/2006/main">
   <p:cSld>
     <p:bg>
-      <p:bgRef idx="1001">
-        <a:schemeClr val="bg1"/>
-      </p:bgRef>
+      <p:bgPr>
+        <a:solidFill>
+          <a:schemeClr val="bg1">
+            <a:lumMod val="95000"/>
+          </a:schemeClr>
+        </a:solidFill>
+        <a:effectLst/>
+      </p:bgPr>
     </p:bg>
     <p:spTree>
       <p:nvGrpSpPr>
@@ -3362,7 +3367,7 @@
         </p:nvSpPr>
         <p:spPr>
           <a:xfrm>
-            <a:off x="1859626" y="931648"/>
+            <a:off x="1818986" y="840208"/>
             <a:ext cx="1259456" cy="461665"/>
           </a:xfrm>
           <a:prstGeom prst="rect">
@@ -3408,7 +3413,7 @@
         </p:nvSpPr>
         <p:spPr>
           <a:xfrm>
-            <a:off x="3252159" y="931651"/>
+            <a:off x="3211519" y="840211"/>
             <a:ext cx="1259456" cy="461665"/>
           </a:xfrm>
           <a:prstGeom prst="rect">
@@ -3454,7 +3459,7 @@
         </p:nvSpPr>
         <p:spPr>
           <a:xfrm>
-            <a:off x="4638134" y="931649"/>
+            <a:off x="4597494" y="840209"/>
             <a:ext cx="2705821" cy="461665"/>
           </a:xfrm>
           <a:prstGeom prst="rect">
@@ -3500,7 +3505,7 @@
         </p:nvSpPr>
         <p:spPr>
           <a:xfrm>
-            <a:off x="7921923" y="931647"/>
+            <a:off x="7881283" y="840207"/>
             <a:ext cx="1259456" cy="461665"/>
           </a:xfrm>
           <a:prstGeom prst="rect">
@@ -3546,7 +3551,7 @@
         </p:nvSpPr>
         <p:spPr>
           <a:xfrm>
-            <a:off x="4753155" y="2757580"/>
+            <a:off x="4712515" y="2666140"/>
             <a:ext cx="1259456" cy="461665"/>
           </a:xfrm>
           <a:prstGeom prst="rect">
@@ -3592,17 +3597,14 @@
         </p:nvSpPr>
         <p:spPr>
           <a:xfrm>
-            <a:off x="1394604" y="2757580"/>
+            <a:off x="1353964" y="2666140"/>
             <a:ext cx="1558506" cy="461665"/>
           </a:xfrm>
           <a:prstGeom prst="rect">
             <a:avLst/>
           </a:prstGeom>
           <a:solidFill>
-            <a:schemeClr val="accent2">
-              <a:lumMod val="60000"/>
-              <a:lumOff val="40000"/>
-            </a:schemeClr>
+            <a:srgbClr val="F19B61"/>
           </a:solidFill>
           <a:ln w="28575">
             <a:solidFill>
@@ -3638,17 +3640,14 @@
         </p:nvSpPr>
         <p:spPr>
           <a:xfrm>
-            <a:off x="3183148" y="2757580"/>
+            <a:off x="3142508" y="2666140"/>
             <a:ext cx="1339970" cy="461665"/>
           </a:xfrm>
           <a:prstGeom prst="rect">
             <a:avLst/>
           </a:prstGeom>
           <a:solidFill>
-            <a:schemeClr val="accent2">
-              <a:lumMod val="60000"/>
-              <a:lumOff val="40000"/>
-            </a:schemeClr>
+            <a:srgbClr val="F19B61"/>
           </a:solidFill>
           <a:ln w="28575">
             <a:solidFill>
@@ -3684,7 +3683,7 @@
         </p:nvSpPr>
         <p:spPr>
           <a:xfrm>
-            <a:off x="6242648" y="2757580"/>
+            <a:off x="6202008" y="2666140"/>
             <a:ext cx="1408981" cy="461665"/>
           </a:xfrm>
           <a:prstGeom prst="rect">
@@ -3730,7 +3729,7 @@
         </p:nvSpPr>
         <p:spPr>
           <a:xfrm>
-            <a:off x="7881666" y="2757580"/>
+            <a:off x="7841026" y="2666140"/>
             <a:ext cx="1339970" cy="461665"/>
           </a:xfrm>
           <a:prstGeom prst="rect">
@@ -3776,7 +3775,7 @@
         </p:nvSpPr>
         <p:spPr>
           <a:xfrm>
-            <a:off x="9451673" y="2757580"/>
+            <a:off x="9411033" y="2666140"/>
             <a:ext cx="1339970" cy="461665"/>
           </a:xfrm>
           <a:prstGeom prst="rect">
@@ -3822,7 +3821,7 @@
         </p:nvSpPr>
         <p:spPr>
           <a:xfrm>
-            <a:off x="2209223" y="4352680"/>
+            <a:off x="2168583" y="4261240"/>
             <a:ext cx="1558505" cy="461665"/>
           </a:xfrm>
           <a:prstGeom prst="rect">
@@ -3868,7 +3867,7 @@
         </p:nvSpPr>
         <p:spPr>
           <a:xfrm>
-            <a:off x="4604491" y="4352678"/>
+            <a:off x="4563851" y="4261238"/>
             <a:ext cx="1558505" cy="461665"/>
           </a:xfrm>
           <a:prstGeom prst="rect">
@@ -3914,7 +3913,7 @@
         </p:nvSpPr>
         <p:spPr>
           <a:xfrm>
-            <a:off x="6999759" y="4352678"/>
+            <a:off x="8465579" y="4266203"/>
             <a:ext cx="2953115" cy="461665"/>
           </a:xfrm>
           <a:prstGeom prst="rect">
@@ -3962,7 +3961,7 @@
         </p:nvCxnSpPr>
         <p:spPr>
           <a:xfrm flipV="1">
-            <a:off x="3881887" y="1544128"/>
+            <a:off x="3841247" y="1452688"/>
             <a:ext cx="0" cy="1086929"/>
           </a:xfrm>
           <a:prstGeom prst="straightConnector1">
@@ -3970,7 +3969,10 @@
           </a:prstGeom>
           <a:ln w="38100">
             <a:solidFill>
-              <a:schemeClr val="tx1"/>
+              <a:schemeClr val="accent6">
+                <a:lumMod val="60000"/>
+                <a:lumOff val="40000"/>
+              </a:schemeClr>
             </a:solidFill>
             <a:tailEnd type="triangle"/>
           </a:ln>
@@ -4004,7 +4006,7 @@
         </p:nvCxnSpPr>
         <p:spPr>
           <a:xfrm>
-            <a:off x="3881887" y="2087592"/>
+            <a:off x="3841247" y="1996152"/>
             <a:ext cx="2001328" cy="0"/>
           </a:xfrm>
           <a:prstGeom prst="line">
@@ -4012,7 +4014,10 @@
           </a:prstGeom>
           <a:ln w="38100">
             <a:solidFill>
-              <a:schemeClr val="tx1"/>
+              <a:schemeClr val="accent6">
+                <a:lumMod val="60000"/>
+                <a:lumOff val="40000"/>
+              </a:schemeClr>
             </a:solidFill>
           </a:ln>
         </p:spPr>
@@ -4047,7 +4052,7 @@
         </p:nvCxnSpPr>
         <p:spPr>
           <a:xfrm>
-            <a:off x="2489354" y="2087592"/>
+            <a:off x="2448714" y="1996152"/>
             <a:ext cx="1395984" cy="2760"/>
           </a:xfrm>
           <a:prstGeom prst="line">
@@ -4055,7 +4060,10 @@
           </a:prstGeom>
           <a:ln w="38100">
             <a:solidFill>
-              <a:schemeClr val="tx1"/>
+              <a:schemeClr val="accent6">
+                <a:lumMod val="60000"/>
+                <a:lumOff val="40000"/>
+              </a:schemeClr>
             </a:solidFill>
           </a:ln>
         </p:spPr>
@@ -4090,7 +4098,7 @@
         </p:nvCxnSpPr>
         <p:spPr>
           <a:xfrm flipV="1">
-            <a:off x="5869758" y="1544128"/>
+            <a:off x="5829118" y="1452688"/>
             <a:ext cx="0" cy="549560"/>
           </a:xfrm>
           <a:prstGeom prst="straightConnector1">
@@ -4098,7 +4106,10 @@
           </a:prstGeom>
           <a:ln w="38100">
             <a:solidFill>
-              <a:schemeClr val="tx1"/>
+              <a:schemeClr val="accent6">
+                <a:lumMod val="60000"/>
+                <a:lumOff val="40000"/>
+              </a:schemeClr>
             </a:solidFill>
             <a:tailEnd type="triangle"/>
           </a:ln>
@@ -4134,7 +4145,7 @@
         </p:nvCxnSpPr>
         <p:spPr>
           <a:xfrm flipV="1">
-            <a:off x="2498670" y="1544128"/>
+            <a:off x="2458030" y="1452688"/>
             <a:ext cx="0" cy="549560"/>
           </a:xfrm>
           <a:prstGeom prst="straightConnector1">
@@ -4142,7 +4153,10 @@
           </a:prstGeom>
           <a:ln w="38100">
             <a:solidFill>
-              <a:schemeClr val="tx1"/>
+              <a:schemeClr val="accent6">
+                <a:lumMod val="60000"/>
+                <a:lumOff val="40000"/>
+              </a:schemeClr>
             </a:solidFill>
             <a:tailEnd type="triangle"/>
           </a:ln>
@@ -4178,8 +4192,270 @@
         </p:nvCxnSpPr>
         <p:spPr>
           <a:xfrm flipV="1">
-            <a:off x="8551651" y="1544128"/>
+            <a:off x="8511011" y="1452688"/>
             <a:ext cx="0" cy="1086929"/>
+          </a:xfrm>
+          <a:prstGeom prst="straightConnector1">
+            <a:avLst/>
+          </a:prstGeom>
+          <a:ln w="38100">
+            <a:solidFill>
+              <a:schemeClr val="accent6">
+                <a:lumMod val="60000"/>
+                <a:lumOff val="40000"/>
+              </a:schemeClr>
+            </a:solidFill>
+            <a:tailEnd type="triangle"/>
+          </a:ln>
+        </p:spPr>
+        <p:style>
+          <a:lnRef idx="1">
+            <a:schemeClr val="accent1"/>
+          </a:lnRef>
+          <a:fillRef idx="0">
+            <a:schemeClr val="accent1"/>
+          </a:fillRef>
+          <a:effectRef idx="0">
+            <a:schemeClr val="accent1"/>
+          </a:effectRef>
+          <a:fontRef idx="minor">
+            <a:schemeClr val="tx1"/>
+          </a:fontRef>
+        </p:style>
+      </p:cxnSp>
+      <p:sp>
+        <p:nvSpPr>
+          <p:cNvPr id="42" name="TextBox 41">
+            <a:extLst>
+              <a:ext uri="{FF2B5EF4-FFF2-40B4-BE49-F238E27FC236}">
+                <a16:creationId xmlns:a16="http://schemas.microsoft.com/office/drawing/2014/main" id="{B79EFBBD-AFB6-079C-6ABC-23876560BE87}"/>
+              </a:ext>
+            </a:extLst>
+          </p:cNvPr>
+          <p:cNvSpPr txBox="1"/>
+          <p:nvPr/>
+        </p:nvSpPr>
+        <p:spPr>
+          <a:xfrm>
+            <a:off x="5320676" y="5644853"/>
+            <a:ext cx="1259456" cy="461665"/>
+          </a:xfrm>
+          <a:prstGeom prst="rect">
+            <a:avLst/>
+          </a:prstGeom>
+          <a:solidFill>
+            <a:srgbClr val="B482DA"/>
+          </a:solidFill>
+          <a:ln w="28575">
+            <a:solidFill>
+              <a:schemeClr val="tx1"/>
+            </a:solidFill>
+          </a:ln>
+        </p:spPr>
+        <p:txBody>
+          <a:bodyPr wrap="square" rtlCol="0">
+            <a:spAutoFit/>
+          </a:bodyPr>
+          <a:lstStyle/>
+          <a:p>
+            <a:pPr algn="ctr"/>
+            <a:r>
+              <a:rPr lang="es-ES" sz="2400" dirty="0"/>
+              <a:t>SPEED</a:t>
+            </a:r>
+          </a:p>
+        </p:txBody>
+      </p:sp>
+      <p:sp>
+        <p:nvSpPr>
+          <p:cNvPr id="43" name="TextBox 42">
+            <a:extLst>
+              <a:ext uri="{FF2B5EF4-FFF2-40B4-BE49-F238E27FC236}">
+                <a16:creationId xmlns:a16="http://schemas.microsoft.com/office/drawing/2014/main" id="{8F4EC1F2-E597-87AD-2E09-1FBA48C52225}"/>
+              </a:ext>
+            </a:extLst>
+          </p:cNvPr>
+          <p:cNvSpPr txBox="1"/>
+          <p:nvPr/>
+        </p:nvSpPr>
+        <p:spPr>
+          <a:xfrm>
+            <a:off x="998842" y="5644853"/>
+            <a:ext cx="2081841" cy="461665"/>
+          </a:xfrm>
+          <a:prstGeom prst="rect">
+            <a:avLst/>
+          </a:prstGeom>
+          <a:solidFill>
+            <a:srgbClr val="B482DA"/>
+          </a:solidFill>
+          <a:ln w="28575">
+            <a:solidFill>
+              <a:schemeClr val="tx1"/>
+            </a:solidFill>
+          </a:ln>
+        </p:spPr>
+        <p:txBody>
+          <a:bodyPr wrap="square" rtlCol="0">
+            <a:spAutoFit/>
+          </a:bodyPr>
+          <a:lstStyle/>
+          <a:p>
+            <a:pPr algn="ctr"/>
+            <a:r>
+              <a:rPr lang="es-ES" sz="2400" dirty="0"/>
+              <a:t>HEADPOSITION</a:t>
+            </a:r>
+          </a:p>
+        </p:txBody>
+      </p:sp>
+      <p:sp>
+        <p:nvSpPr>
+          <p:cNvPr id="44" name="TextBox 43">
+            <a:extLst>
+              <a:ext uri="{FF2B5EF4-FFF2-40B4-BE49-F238E27FC236}">
+                <a16:creationId xmlns:a16="http://schemas.microsoft.com/office/drawing/2014/main" id="{D2177828-1C9E-AEE3-37C3-171DEDC9C734}"/>
+              </a:ext>
+            </a:extLst>
+          </p:cNvPr>
+          <p:cNvSpPr txBox="1"/>
+          <p:nvPr/>
+        </p:nvSpPr>
+        <p:spPr>
+          <a:xfrm>
+            <a:off x="3540758" y="5644853"/>
+            <a:ext cx="1408980" cy="461665"/>
+          </a:xfrm>
+          <a:prstGeom prst="rect">
+            <a:avLst/>
+          </a:prstGeom>
+          <a:solidFill>
+            <a:srgbClr val="B482DA"/>
+          </a:solidFill>
+          <a:ln w="28575">
+            <a:solidFill>
+              <a:schemeClr val="tx1"/>
+            </a:solidFill>
+          </a:ln>
+        </p:spPr>
+        <p:txBody>
+          <a:bodyPr wrap="square" rtlCol="0">
+            <a:spAutoFit/>
+          </a:bodyPr>
+          <a:lstStyle/>
+          <a:p>
+            <a:pPr algn="ctr"/>
+            <a:r>
+              <a:rPr lang="es-ES" sz="2400" dirty="0"/>
+              <a:t>DISTANCE</a:t>
+            </a:r>
+          </a:p>
+        </p:txBody>
+      </p:sp>
+      <p:sp>
+        <p:nvSpPr>
+          <p:cNvPr id="45" name="TextBox 44">
+            <a:extLst>
+              <a:ext uri="{FF2B5EF4-FFF2-40B4-BE49-F238E27FC236}">
+                <a16:creationId xmlns:a16="http://schemas.microsoft.com/office/drawing/2014/main" id="{02140F84-EF8E-4624-34F8-6ECC6D3E0244}"/>
+              </a:ext>
+            </a:extLst>
+          </p:cNvPr>
+          <p:cNvSpPr txBox="1"/>
+          <p:nvPr/>
+        </p:nvSpPr>
+        <p:spPr>
+          <a:xfrm>
+            <a:off x="6906498" y="5644853"/>
+            <a:ext cx="1408981" cy="461665"/>
+          </a:xfrm>
+          <a:prstGeom prst="rect">
+            <a:avLst/>
+          </a:prstGeom>
+          <a:solidFill>
+            <a:srgbClr val="B482DA"/>
+          </a:solidFill>
+          <a:ln w="28575">
+            <a:solidFill>
+              <a:schemeClr val="tx1"/>
+            </a:solidFill>
+          </a:ln>
+        </p:spPr>
+        <p:txBody>
+          <a:bodyPr wrap="square" rtlCol="0">
+            <a:spAutoFit/>
+          </a:bodyPr>
+          <a:lstStyle/>
+          <a:p>
+            <a:pPr algn="ctr"/>
+            <a:r>
+              <a:rPr lang="es-ES" sz="2400" dirty="0"/>
+              <a:t>STEERING</a:t>
+            </a:r>
+          </a:p>
+        </p:txBody>
+      </p:sp>
+      <p:sp>
+        <p:nvSpPr>
+          <p:cNvPr id="46" name="TextBox 45">
+            <a:extLst>
+              <a:ext uri="{FF2B5EF4-FFF2-40B4-BE49-F238E27FC236}">
+                <a16:creationId xmlns:a16="http://schemas.microsoft.com/office/drawing/2014/main" id="{30136F4B-3984-FD55-25ED-F1C3A7ECEC16}"/>
+              </a:ext>
+            </a:extLst>
+          </p:cNvPr>
+          <p:cNvSpPr txBox="1"/>
+          <p:nvPr/>
+        </p:nvSpPr>
+        <p:spPr>
+          <a:xfrm>
+            <a:off x="8545516" y="5644857"/>
+            <a:ext cx="2878350" cy="461665"/>
+          </a:xfrm>
+          <a:prstGeom prst="rect">
+            <a:avLst/>
+          </a:prstGeom>
+          <a:solidFill>
+            <a:srgbClr val="EEAAAA"/>
+          </a:solidFill>
+          <a:ln w="28575">
+            <a:solidFill>
+              <a:schemeClr val="tx1"/>
+            </a:solidFill>
+          </a:ln>
+        </p:spPr>
+        <p:txBody>
+          <a:bodyPr wrap="square" rtlCol="0">
+            <a:spAutoFit/>
+          </a:bodyPr>
+          <a:lstStyle/>
+          <a:p>
+            <a:pPr algn="ctr"/>
+            <a:r>
+              <a:rPr lang="es-ES" sz="2400" dirty="0"/>
+              <a:t>BUTTON_INTERRUPT</a:t>
+            </a:r>
+          </a:p>
+        </p:txBody>
+      </p:sp>
+      <p:cxnSp>
+        <p:nvCxnSpPr>
+          <p:cNvPr id="5" name="Straight Arrow Connector 4">
+            <a:extLst>
+              <a:ext uri="{FF2B5EF4-FFF2-40B4-BE49-F238E27FC236}">
+                <a16:creationId xmlns:a16="http://schemas.microsoft.com/office/drawing/2014/main" id="{92E5078E-76CD-82F9-CD60-59AB110D7D87}"/>
+              </a:ext>
+            </a:extLst>
+          </p:cNvPr>
+          <p:cNvCxnSpPr>
+            <a:cxnSpLocks/>
+          </p:cNvCxnSpPr>
+          <p:nvPr/>
+        </p:nvCxnSpPr>
+        <p:spPr>
+          <a:xfrm>
+            <a:off x="10081018" y="3268549"/>
+            <a:ext cx="0" cy="836762"/>
           </a:xfrm>
           <a:prstGeom prst="straightConnector1">
             <a:avLst/>
@@ -4206,236 +4482,1297 @@
           </a:fontRef>
         </p:style>
       </p:cxnSp>
-      <p:sp>
-        <p:nvSpPr>
-          <p:cNvPr id="42" name="TextBox 41">
-            <a:extLst>
-              <a:ext uri="{FF2B5EF4-FFF2-40B4-BE49-F238E27FC236}">
-                <a16:creationId xmlns:a16="http://schemas.microsoft.com/office/drawing/2014/main" id="{B79EFBBD-AFB6-079C-6ABC-23876560BE87}"/>
-              </a:ext>
-            </a:extLst>
-          </p:cNvPr>
-          <p:cNvSpPr txBox="1"/>
+      <p:cxnSp>
+        <p:nvCxnSpPr>
+          <p:cNvPr id="18" name="Straight Arrow Connector 17">
+            <a:extLst>
+              <a:ext uri="{FF2B5EF4-FFF2-40B4-BE49-F238E27FC236}">
+                <a16:creationId xmlns:a16="http://schemas.microsoft.com/office/drawing/2014/main" id="{AAC9BDB8-8BC8-6ABD-EAC6-2D345F46BE24}"/>
+              </a:ext>
+            </a:extLst>
+          </p:cNvPr>
+          <p:cNvCxnSpPr>
+            <a:cxnSpLocks/>
+          </p:cNvCxnSpPr>
           <p:nvPr/>
-        </p:nvSpPr>
-        <p:spPr>
-          <a:xfrm>
-            <a:off x="5457645" y="5736293"/>
-            <a:ext cx="1259456" cy="461665"/>
-          </a:xfrm>
-          <a:prstGeom prst="rect">
-            <a:avLst/>
-          </a:prstGeom>
-          <a:solidFill>
-            <a:schemeClr val="accent4">
-              <a:lumMod val="40000"/>
-              <a:lumOff val="60000"/>
-            </a:schemeClr>
-          </a:solidFill>
-          <a:ln w="28575">
+        </p:nvCxnSpPr>
+        <p:spPr>
+          <a:xfrm flipV="1">
+            <a:off x="9984691" y="4894628"/>
+            <a:ext cx="0" cy="646708"/>
+          </a:xfrm>
+          <a:prstGeom prst="straightConnector1">
+            <a:avLst/>
+          </a:prstGeom>
+          <a:ln w="38100">
             <a:solidFill>
               <a:schemeClr val="tx1"/>
             </a:solidFill>
+            <a:tailEnd type="triangle"/>
           </a:ln>
         </p:spPr>
-        <p:txBody>
-          <a:bodyPr wrap="square" rtlCol="0">
-            <a:spAutoFit/>
-          </a:bodyPr>
-          <a:lstStyle/>
-          <a:p>
-            <a:pPr algn="ctr"/>
-            <a:r>
-              <a:rPr lang="es-ES" sz="2400" dirty="0"/>
-              <a:t>SPEED</a:t>
-            </a:r>
-          </a:p>
-        </p:txBody>
-      </p:sp>
-      <p:sp>
-        <p:nvSpPr>
-          <p:cNvPr id="43" name="TextBox 42">
-            <a:extLst>
-              <a:ext uri="{FF2B5EF4-FFF2-40B4-BE49-F238E27FC236}">
-                <a16:creationId xmlns:a16="http://schemas.microsoft.com/office/drawing/2014/main" id="{8F4EC1F2-E597-87AD-2E09-1FBA48C52225}"/>
-              </a:ext>
-            </a:extLst>
-          </p:cNvPr>
-          <p:cNvSpPr txBox="1"/>
+        <p:style>
+          <a:lnRef idx="1">
+            <a:schemeClr val="accent1"/>
+          </a:lnRef>
+          <a:fillRef idx="0">
+            <a:schemeClr val="accent1"/>
+          </a:fillRef>
+          <a:effectRef idx="0">
+            <a:schemeClr val="accent1"/>
+          </a:effectRef>
+          <a:fontRef idx="minor">
+            <a:schemeClr val="tx1"/>
+          </a:fontRef>
+        </p:style>
+      </p:cxnSp>
+      <p:cxnSp>
+        <p:nvCxnSpPr>
+          <p:cNvPr id="21" name="Straight Arrow Connector 20">
+            <a:extLst>
+              <a:ext uri="{FF2B5EF4-FFF2-40B4-BE49-F238E27FC236}">
+                <a16:creationId xmlns:a16="http://schemas.microsoft.com/office/drawing/2014/main" id="{744A22A8-1C97-EE4C-265A-759E211354C0}"/>
+              </a:ext>
+            </a:extLst>
+          </p:cNvPr>
+          <p:cNvCxnSpPr>
+            <a:cxnSpLocks/>
+          </p:cNvCxnSpPr>
           <p:nvPr/>
-        </p:nvSpPr>
-        <p:spPr>
-          <a:xfrm>
-            <a:off x="1039482" y="5736293"/>
-            <a:ext cx="2081841" cy="461665"/>
-          </a:xfrm>
-          <a:prstGeom prst="rect">
-            <a:avLst/>
-          </a:prstGeom>
-          <a:solidFill>
-            <a:schemeClr val="accent2">
-              <a:lumMod val="60000"/>
-              <a:lumOff val="40000"/>
-            </a:schemeClr>
-          </a:solidFill>
-          <a:ln w="28575">
+        </p:nvCxnSpPr>
+        <p:spPr>
+          <a:xfrm>
+            <a:off x="7372324" y="3268549"/>
+            <a:ext cx="0" cy="2272787"/>
+          </a:xfrm>
+          <a:prstGeom prst="straightConnector1">
+            <a:avLst/>
+          </a:prstGeom>
+          <a:ln w="38100">
             <a:solidFill>
-              <a:schemeClr val="tx1"/>
+              <a:srgbClr val="B482DA"/>
+            </a:solidFill>
+            <a:tailEnd type="triangle"/>
+          </a:ln>
+        </p:spPr>
+        <p:style>
+          <a:lnRef idx="1">
+            <a:schemeClr val="accent1"/>
+          </a:lnRef>
+          <a:fillRef idx="0">
+            <a:schemeClr val="accent1"/>
+          </a:fillRef>
+          <a:effectRef idx="0">
+            <a:schemeClr val="accent1"/>
+          </a:effectRef>
+          <a:fontRef idx="minor">
+            <a:schemeClr val="tx1"/>
+          </a:fontRef>
+        </p:style>
+      </p:cxnSp>
+      <p:cxnSp>
+        <p:nvCxnSpPr>
+          <p:cNvPr id="24" name="Straight Connector 23">
+            <a:extLst>
+              <a:ext uri="{FF2B5EF4-FFF2-40B4-BE49-F238E27FC236}">
+                <a16:creationId xmlns:a16="http://schemas.microsoft.com/office/drawing/2014/main" id="{85B37C38-2017-5EFB-65F3-9D3C2DDD68D8}"/>
+              </a:ext>
+            </a:extLst>
+          </p:cNvPr>
+          <p:cNvCxnSpPr>
+            <a:cxnSpLocks/>
+          </p:cNvCxnSpPr>
+          <p:nvPr/>
+        </p:nvCxnSpPr>
+        <p:spPr>
+          <a:xfrm flipV="1">
+            <a:off x="1653937" y="3589162"/>
+            <a:ext cx="3688306" cy="11215"/>
+          </a:xfrm>
+          <a:prstGeom prst="line">
+            <a:avLst/>
+          </a:prstGeom>
+          <a:ln w="38100">
+            <a:solidFill>
+              <a:schemeClr val="accent5">
+                <a:lumMod val="60000"/>
+                <a:lumOff val="40000"/>
+              </a:schemeClr>
             </a:solidFill>
           </a:ln>
         </p:spPr>
-        <p:txBody>
-          <a:bodyPr wrap="square" rtlCol="0">
-            <a:spAutoFit/>
-          </a:bodyPr>
-          <a:lstStyle/>
-          <a:p>
-            <a:pPr algn="ctr"/>
-            <a:r>
-              <a:rPr lang="es-ES" sz="2400" dirty="0"/>
-              <a:t>HEADPOSITION</a:t>
-            </a:r>
-          </a:p>
-        </p:txBody>
-      </p:sp>
-      <p:sp>
-        <p:nvSpPr>
-          <p:cNvPr id="44" name="TextBox 43">
-            <a:extLst>
-              <a:ext uri="{FF2B5EF4-FFF2-40B4-BE49-F238E27FC236}">
-                <a16:creationId xmlns:a16="http://schemas.microsoft.com/office/drawing/2014/main" id="{D2177828-1C9E-AEE3-37C3-171DEDC9C734}"/>
-              </a:ext>
-            </a:extLst>
-          </p:cNvPr>
-          <p:cNvSpPr txBox="1"/>
+        <p:style>
+          <a:lnRef idx="1">
+            <a:schemeClr val="accent1"/>
+          </a:lnRef>
+          <a:fillRef idx="0">
+            <a:schemeClr val="accent1"/>
+          </a:fillRef>
+          <a:effectRef idx="0">
+            <a:schemeClr val="accent1"/>
+          </a:effectRef>
+          <a:fontRef idx="minor">
+            <a:schemeClr val="tx1"/>
+          </a:fontRef>
+        </p:style>
+      </p:cxnSp>
+      <p:cxnSp>
+        <p:nvCxnSpPr>
+          <p:cNvPr id="33" name="Straight Arrow Connector 32">
+            <a:extLst>
+              <a:ext uri="{FF2B5EF4-FFF2-40B4-BE49-F238E27FC236}">
+                <a16:creationId xmlns:a16="http://schemas.microsoft.com/office/drawing/2014/main" id="{2C9A43FD-B441-4174-3479-EB50482BBE81}"/>
+              </a:ext>
+            </a:extLst>
+          </p:cNvPr>
+          <p:cNvCxnSpPr>
+            <a:cxnSpLocks/>
+          </p:cNvCxnSpPr>
           <p:nvPr/>
-        </p:nvSpPr>
-        <p:spPr>
-          <a:xfrm>
-            <a:off x="3657600" y="5736293"/>
-            <a:ext cx="1408980" cy="461665"/>
-          </a:xfrm>
-          <a:prstGeom prst="rect">
-            <a:avLst/>
-          </a:prstGeom>
-          <a:solidFill>
-            <a:schemeClr val="accent2">
-              <a:lumMod val="60000"/>
-              <a:lumOff val="40000"/>
-            </a:schemeClr>
-          </a:solidFill>
-          <a:ln w="28575">
+        </p:nvCxnSpPr>
+        <p:spPr>
+          <a:xfrm>
+            <a:off x="2947835" y="3580536"/>
+            <a:ext cx="0" cy="524775"/>
+          </a:xfrm>
+          <a:prstGeom prst="straightConnector1">
+            <a:avLst/>
+          </a:prstGeom>
+          <a:ln w="38100">
             <a:solidFill>
-              <a:schemeClr val="tx1"/>
+              <a:schemeClr val="accent5">
+                <a:lumMod val="60000"/>
+                <a:lumOff val="40000"/>
+              </a:schemeClr>
+            </a:solidFill>
+            <a:tailEnd type="triangle"/>
+          </a:ln>
+        </p:spPr>
+        <p:style>
+          <a:lnRef idx="1">
+            <a:schemeClr val="accent1"/>
+          </a:lnRef>
+          <a:fillRef idx="0">
+            <a:schemeClr val="accent1"/>
+          </a:fillRef>
+          <a:effectRef idx="0">
+            <a:schemeClr val="accent1"/>
+          </a:effectRef>
+          <a:fontRef idx="minor">
+            <a:schemeClr val="tx1"/>
+          </a:fontRef>
+        </p:style>
+      </p:cxnSp>
+      <p:cxnSp>
+        <p:nvCxnSpPr>
+          <p:cNvPr id="35" name="Straight Connector 34">
+            <a:extLst>
+              <a:ext uri="{FF2B5EF4-FFF2-40B4-BE49-F238E27FC236}">
+                <a16:creationId xmlns:a16="http://schemas.microsoft.com/office/drawing/2014/main" id="{5AB4C885-832B-1095-CAFC-E6B2C92C6AAD}"/>
+              </a:ext>
+            </a:extLst>
+          </p:cNvPr>
+          <p:cNvCxnSpPr>
+            <a:cxnSpLocks/>
+          </p:cNvCxnSpPr>
+          <p:nvPr/>
+        </p:nvCxnSpPr>
+        <p:spPr>
+          <a:xfrm>
+            <a:off x="3108004" y="3709790"/>
+            <a:ext cx="3597501" cy="0"/>
+          </a:xfrm>
+          <a:prstGeom prst="line">
+            <a:avLst/>
+          </a:prstGeom>
+          <a:ln w="38100">
+            <a:solidFill>
+              <a:schemeClr val="accent5">
+                <a:lumMod val="60000"/>
+                <a:lumOff val="40000"/>
+              </a:schemeClr>
             </a:solidFill>
           </a:ln>
         </p:spPr>
-        <p:txBody>
-          <a:bodyPr wrap="square" rtlCol="0">
-            <a:spAutoFit/>
-          </a:bodyPr>
-          <a:lstStyle/>
-          <a:p>
-            <a:pPr algn="ctr"/>
-            <a:r>
-              <a:rPr lang="es-ES" sz="2400" dirty="0"/>
-              <a:t>DISTANCE</a:t>
-            </a:r>
-          </a:p>
-        </p:txBody>
-      </p:sp>
-      <p:sp>
-        <p:nvSpPr>
-          <p:cNvPr id="45" name="TextBox 44">
-            <a:extLst>
-              <a:ext uri="{FF2B5EF4-FFF2-40B4-BE49-F238E27FC236}">
-                <a16:creationId xmlns:a16="http://schemas.microsoft.com/office/drawing/2014/main" id="{02140F84-EF8E-4624-34F8-6ECC6D3E0244}"/>
-              </a:ext>
-            </a:extLst>
-          </p:cNvPr>
-          <p:cNvSpPr txBox="1"/>
+        <p:style>
+          <a:lnRef idx="1">
+            <a:schemeClr val="accent1"/>
+          </a:lnRef>
+          <a:fillRef idx="0">
+            <a:schemeClr val="accent1"/>
+          </a:fillRef>
+          <a:effectRef idx="0">
+            <a:schemeClr val="accent1"/>
+          </a:effectRef>
+          <a:fontRef idx="minor">
+            <a:schemeClr val="tx1"/>
+          </a:fontRef>
+        </p:style>
+      </p:cxnSp>
+      <p:cxnSp>
+        <p:nvCxnSpPr>
+          <p:cNvPr id="39" name="Straight Connector 38">
+            <a:extLst>
+              <a:ext uri="{FF2B5EF4-FFF2-40B4-BE49-F238E27FC236}">
+                <a16:creationId xmlns:a16="http://schemas.microsoft.com/office/drawing/2014/main" id="{C7F2EEE3-B07D-30C7-54DB-7B2ED2330666}"/>
+              </a:ext>
+            </a:extLst>
+          </p:cNvPr>
+          <p:cNvCxnSpPr>
+            <a:cxnSpLocks/>
+          </p:cNvCxnSpPr>
           <p:nvPr/>
-        </p:nvSpPr>
-        <p:spPr>
-          <a:xfrm>
-            <a:off x="6947138" y="5736293"/>
-            <a:ext cx="1408981" cy="461665"/>
-          </a:xfrm>
-          <a:prstGeom prst="rect">
-            <a:avLst/>
-          </a:prstGeom>
-          <a:solidFill>
-            <a:schemeClr val="accent4">
-              <a:lumMod val="40000"/>
-              <a:lumOff val="60000"/>
-            </a:schemeClr>
-          </a:solidFill>
-          <a:ln w="28575">
+        </p:nvCxnSpPr>
+        <p:spPr>
+          <a:xfrm>
+            <a:off x="6705505" y="3228148"/>
+            <a:ext cx="0" cy="490268"/>
+          </a:xfrm>
+          <a:prstGeom prst="line">
+            <a:avLst/>
+          </a:prstGeom>
+          <a:ln w="38100">
             <a:solidFill>
-              <a:schemeClr val="tx1"/>
+              <a:schemeClr val="accent5">
+                <a:lumMod val="60000"/>
+                <a:lumOff val="40000"/>
+              </a:schemeClr>
             </a:solidFill>
           </a:ln>
         </p:spPr>
-        <p:txBody>
-          <a:bodyPr wrap="square" rtlCol="0">
-            <a:spAutoFit/>
-          </a:bodyPr>
-          <a:lstStyle/>
-          <a:p>
-            <a:pPr algn="ctr"/>
-            <a:r>
-              <a:rPr lang="es-ES" sz="2400" dirty="0"/>
-              <a:t>STEERING</a:t>
-            </a:r>
-          </a:p>
-        </p:txBody>
-      </p:sp>
-      <p:sp>
-        <p:nvSpPr>
-          <p:cNvPr id="46" name="TextBox 45">
-            <a:extLst>
-              <a:ext uri="{FF2B5EF4-FFF2-40B4-BE49-F238E27FC236}">
-                <a16:creationId xmlns:a16="http://schemas.microsoft.com/office/drawing/2014/main" id="{30136F4B-3984-FD55-25ED-F1C3A7ECEC16}"/>
-              </a:ext>
-            </a:extLst>
-          </p:cNvPr>
-          <p:cNvSpPr txBox="1"/>
+        <p:style>
+          <a:lnRef idx="1">
+            <a:schemeClr val="accent1"/>
+          </a:lnRef>
+          <a:fillRef idx="0">
+            <a:schemeClr val="accent1"/>
+          </a:fillRef>
+          <a:effectRef idx="0">
+            <a:schemeClr val="accent1"/>
+          </a:effectRef>
+          <a:fontRef idx="minor">
+            <a:schemeClr val="tx1"/>
+          </a:fontRef>
+        </p:style>
+      </p:cxnSp>
+      <p:cxnSp>
+        <p:nvCxnSpPr>
+          <p:cNvPr id="48" name="Straight Arrow Connector 47">
+            <a:extLst>
+              <a:ext uri="{FF2B5EF4-FFF2-40B4-BE49-F238E27FC236}">
+                <a16:creationId xmlns:a16="http://schemas.microsoft.com/office/drawing/2014/main" id="{3935F501-3BF1-9209-DA4E-99961156F22D}"/>
+              </a:ext>
+            </a:extLst>
+          </p:cNvPr>
+          <p:cNvCxnSpPr>
+            <a:cxnSpLocks/>
+          </p:cNvCxnSpPr>
           <p:nvPr/>
-        </p:nvSpPr>
-        <p:spPr>
-          <a:xfrm>
-            <a:off x="8586156" y="5736297"/>
-            <a:ext cx="2878350" cy="461665"/>
-          </a:xfrm>
-          <a:prstGeom prst="rect">
-            <a:avLst/>
-          </a:prstGeom>
-          <a:solidFill>
-            <a:schemeClr val="accent4">
-              <a:lumMod val="40000"/>
-              <a:lumOff val="60000"/>
-            </a:schemeClr>
-          </a:solidFill>
-          <a:ln w="28575">
+        </p:nvCxnSpPr>
+        <p:spPr>
+          <a:xfrm>
+            <a:off x="3125256" y="3709790"/>
+            <a:ext cx="0" cy="395521"/>
+          </a:xfrm>
+          <a:prstGeom prst="straightConnector1">
+            <a:avLst/>
+          </a:prstGeom>
+          <a:ln w="38100">
             <a:solidFill>
-              <a:schemeClr val="tx1"/>
+              <a:schemeClr val="accent5">
+                <a:lumMod val="60000"/>
+                <a:lumOff val="40000"/>
+              </a:schemeClr>
+            </a:solidFill>
+            <a:tailEnd type="triangle"/>
+          </a:ln>
+        </p:spPr>
+        <p:style>
+          <a:lnRef idx="1">
+            <a:schemeClr val="accent1"/>
+          </a:lnRef>
+          <a:fillRef idx="0">
+            <a:schemeClr val="accent1"/>
+          </a:fillRef>
+          <a:effectRef idx="0">
+            <a:schemeClr val="accent1"/>
+          </a:effectRef>
+          <a:fontRef idx="minor">
+            <a:schemeClr val="tx1"/>
+          </a:fontRef>
+        </p:style>
+      </p:cxnSp>
+      <p:cxnSp>
+        <p:nvCxnSpPr>
+          <p:cNvPr id="50" name="Straight Connector 49">
+            <a:extLst>
+              <a:ext uri="{FF2B5EF4-FFF2-40B4-BE49-F238E27FC236}">
+                <a16:creationId xmlns:a16="http://schemas.microsoft.com/office/drawing/2014/main" id="{468A5EED-95B2-959C-3388-FD99C8D28BD3}"/>
+              </a:ext>
+            </a:extLst>
+          </p:cNvPr>
+          <p:cNvCxnSpPr>
+            <a:cxnSpLocks/>
+          </p:cNvCxnSpPr>
+          <p:nvPr/>
+        </p:nvCxnSpPr>
+        <p:spPr>
+          <a:xfrm>
+            <a:off x="1970750" y="3413615"/>
+            <a:ext cx="567908" cy="0"/>
+          </a:xfrm>
+          <a:prstGeom prst="line">
+            <a:avLst/>
+          </a:prstGeom>
+          <a:ln w="38100">
+            <a:solidFill>
+              <a:srgbClr val="F19B61"/>
             </a:solidFill>
           </a:ln>
         </p:spPr>
-        <p:txBody>
-          <a:bodyPr wrap="square" rtlCol="0">
-            <a:spAutoFit/>
-          </a:bodyPr>
-          <a:lstStyle/>
-          <a:p>
-            <a:pPr algn="ctr"/>
-            <a:r>
-              <a:rPr lang="es-ES" sz="2400" dirty="0"/>
-              <a:t>BUTTON_INTERRUPT</a:t>
-            </a:r>
-          </a:p>
-        </p:txBody>
-      </p:sp>
+        <p:style>
+          <a:lnRef idx="1">
+            <a:schemeClr val="accent1"/>
+          </a:lnRef>
+          <a:fillRef idx="0">
+            <a:schemeClr val="accent1"/>
+          </a:fillRef>
+          <a:effectRef idx="0">
+            <a:schemeClr val="accent1"/>
+          </a:effectRef>
+          <a:fontRef idx="minor">
+            <a:schemeClr val="tx1"/>
+          </a:fontRef>
+        </p:style>
+      </p:cxnSp>
+      <p:cxnSp>
+        <p:nvCxnSpPr>
+          <p:cNvPr id="53" name="Straight Connector 52">
+            <a:extLst>
+              <a:ext uri="{FF2B5EF4-FFF2-40B4-BE49-F238E27FC236}">
+                <a16:creationId xmlns:a16="http://schemas.microsoft.com/office/drawing/2014/main" id="{61D84F0F-42AA-4BBF-7E08-B77F6C6706EF}"/>
+              </a:ext>
+            </a:extLst>
+          </p:cNvPr>
+          <p:cNvCxnSpPr>
+            <a:cxnSpLocks/>
+          </p:cNvCxnSpPr>
+          <p:nvPr/>
+        </p:nvCxnSpPr>
+        <p:spPr>
+          <a:xfrm>
+            <a:off x="1989439" y="3268549"/>
+            <a:ext cx="0" cy="1626079"/>
+          </a:xfrm>
+          <a:prstGeom prst="line">
+            <a:avLst/>
+          </a:prstGeom>
+          <a:ln w="38100">
+            <a:solidFill>
+              <a:srgbClr val="F19B61"/>
+            </a:solidFill>
+          </a:ln>
+        </p:spPr>
+        <p:style>
+          <a:lnRef idx="1">
+            <a:schemeClr val="accent1"/>
+          </a:lnRef>
+          <a:fillRef idx="0">
+            <a:schemeClr val="accent1"/>
+          </a:fillRef>
+          <a:effectRef idx="0">
+            <a:schemeClr val="accent1"/>
+          </a:effectRef>
+          <a:fontRef idx="minor">
+            <a:schemeClr val="tx1"/>
+          </a:fontRef>
+        </p:style>
+      </p:cxnSp>
+      <p:cxnSp>
+        <p:nvCxnSpPr>
+          <p:cNvPr id="55" name="Straight Arrow Connector 54">
+            <a:extLst>
+              <a:ext uri="{FF2B5EF4-FFF2-40B4-BE49-F238E27FC236}">
+                <a16:creationId xmlns:a16="http://schemas.microsoft.com/office/drawing/2014/main" id="{856C0476-6A94-5F81-4684-2E4666D345AC}"/>
+              </a:ext>
+            </a:extLst>
+          </p:cNvPr>
+          <p:cNvCxnSpPr>
+            <a:cxnSpLocks/>
+          </p:cNvCxnSpPr>
+          <p:nvPr/>
+        </p:nvCxnSpPr>
+        <p:spPr>
+          <a:xfrm>
+            <a:off x="2538658" y="3407290"/>
+            <a:ext cx="0" cy="698021"/>
+          </a:xfrm>
+          <a:prstGeom prst="straightConnector1">
+            <a:avLst/>
+          </a:prstGeom>
+          <a:ln w="38100">
+            <a:solidFill>
+              <a:srgbClr val="F19B61"/>
+            </a:solidFill>
+            <a:tailEnd type="triangle"/>
+          </a:ln>
+        </p:spPr>
+        <p:style>
+          <a:lnRef idx="1">
+            <a:schemeClr val="accent1"/>
+          </a:lnRef>
+          <a:fillRef idx="0">
+            <a:schemeClr val="accent1"/>
+          </a:fillRef>
+          <a:effectRef idx="0">
+            <a:schemeClr val="accent1"/>
+          </a:effectRef>
+          <a:fontRef idx="minor">
+            <a:schemeClr val="tx1"/>
+          </a:fontRef>
+        </p:style>
+      </p:cxnSp>
+      <p:cxnSp>
+        <p:nvCxnSpPr>
+          <p:cNvPr id="58" name="Straight Connector 57">
+            <a:extLst>
+              <a:ext uri="{FF2B5EF4-FFF2-40B4-BE49-F238E27FC236}">
+                <a16:creationId xmlns:a16="http://schemas.microsoft.com/office/drawing/2014/main" id="{B4F954DF-B9C3-7A58-AD5A-C5CBF1C3F0AF}"/>
+              </a:ext>
+            </a:extLst>
+          </p:cNvPr>
+          <p:cNvCxnSpPr>
+            <a:cxnSpLocks/>
+          </p:cNvCxnSpPr>
+          <p:nvPr/>
+        </p:nvCxnSpPr>
+        <p:spPr>
+          <a:xfrm>
+            <a:off x="2727000" y="3413615"/>
+            <a:ext cx="1085493" cy="0"/>
+          </a:xfrm>
+          <a:prstGeom prst="line">
+            <a:avLst/>
+          </a:prstGeom>
+          <a:ln w="38100">
+            <a:solidFill>
+              <a:srgbClr val="F19B61"/>
+            </a:solidFill>
+          </a:ln>
+        </p:spPr>
+        <p:style>
+          <a:lnRef idx="1">
+            <a:schemeClr val="accent1"/>
+          </a:lnRef>
+          <a:fillRef idx="0">
+            <a:schemeClr val="accent1"/>
+          </a:fillRef>
+          <a:effectRef idx="0">
+            <a:schemeClr val="accent1"/>
+          </a:effectRef>
+          <a:fontRef idx="minor">
+            <a:schemeClr val="tx1"/>
+          </a:fontRef>
+        </p:style>
+      </p:cxnSp>
+      <p:cxnSp>
+        <p:nvCxnSpPr>
+          <p:cNvPr id="60" name="Straight Connector 59">
+            <a:extLst>
+              <a:ext uri="{FF2B5EF4-FFF2-40B4-BE49-F238E27FC236}">
+                <a16:creationId xmlns:a16="http://schemas.microsoft.com/office/drawing/2014/main" id="{75EA9C05-7877-1444-E6F3-D803BEC89211}"/>
+              </a:ext>
+            </a:extLst>
+          </p:cNvPr>
+          <p:cNvCxnSpPr>
+            <a:cxnSpLocks/>
+          </p:cNvCxnSpPr>
+          <p:nvPr/>
+        </p:nvCxnSpPr>
+        <p:spPr>
+          <a:xfrm>
+            <a:off x="2742240" y="3407290"/>
+            <a:ext cx="0" cy="714095"/>
+          </a:xfrm>
+          <a:prstGeom prst="line">
+            <a:avLst/>
+          </a:prstGeom>
+          <a:ln w="38100">
+            <a:solidFill>
+              <a:srgbClr val="F19B61"/>
+            </a:solidFill>
+          </a:ln>
+        </p:spPr>
+        <p:style>
+          <a:lnRef idx="1">
+            <a:schemeClr val="accent1"/>
+          </a:lnRef>
+          <a:fillRef idx="0">
+            <a:schemeClr val="accent1"/>
+          </a:fillRef>
+          <a:effectRef idx="0">
+            <a:schemeClr val="accent1"/>
+          </a:effectRef>
+          <a:fontRef idx="minor">
+            <a:schemeClr val="tx1"/>
+          </a:fontRef>
+        </p:style>
+      </p:cxnSp>
+      <p:cxnSp>
+        <p:nvCxnSpPr>
+          <p:cNvPr id="64" name="Straight Arrow Connector 63">
+            <a:extLst>
+              <a:ext uri="{FF2B5EF4-FFF2-40B4-BE49-F238E27FC236}">
+                <a16:creationId xmlns:a16="http://schemas.microsoft.com/office/drawing/2014/main" id="{D919A86B-BD76-56DA-972B-1EFF6549F821}"/>
+              </a:ext>
+            </a:extLst>
+          </p:cNvPr>
+          <p:cNvCxnSpPr>
+            <a:cxnSpLocks/>
+          </p:cNvCxnSpPr>
+          <p:nvPr/>
+        </p:nvCxnSpPr>
+        <p:spPr>
+          <a:xfrm flipV="1">
+            <a:off x="3812493" y="3200400"/>
+            <a:ext cx="0" cy="225806"/>
+          </a:xfrm>
+          <a:prstGeom prst="straightConnector1">
+            <a:avLst/>
+          </a:prstGeom>
+          <a:ln w="38100">
+            <a:solidFill>
+              <a:srgbClr val="F19B61"/>
+            </a:solidFill>
+            <a:tailEnd type="triangle"/>
+          </a:ln>
+        </p:spPr>
+        <p:style>
+          <a:lnRef idx="1">
+            <a:schemeClr val="accent1"/>
+          </a:lnRef>
+          <a:fillRef idx="0">
+            <a:schemeClr val="accent1"/>
+          </a:fillRef>
+          <a:effectRef idx="0">
+            <a:schemeClr val="accent1"/>
+          </a:effectRef>
+          <a:fontRef idx="minor">
+            <a:schemeClr val="tx1"/>
+          </a:fontRef>
+        </p:style>
+      </p:cxnSp>
+      <p:cxnSp>
+        <p:nvCxnSpPr>
+          <p:cNvPr id="65" name="Straight Connector 64">
+            <a:extLst>
+              <a:ext uri="{FF2B5EF4-FFF2-40B4-BE49-F238E27FC236}">
+                <a16:creationId xmlns:a16="http://schemas.microsoft.com/office/drawing/2014/main" id="{C966176F-22C4-E380-3242-491C6A721620}"/>
+              </a:ext>
+            </a:extLst>
+          </p:cNvPr>
+          <p:cNvCxnSpPr>
+            <a:cxnSpLocks/>
+          </p:cNvCxnSpPr>
+          <p:nvPr/>
+        </p:nvCxnSpPr>
+        <p:spPr>
+          <a:xfrm>
+            <a:off x="3324585" y="3840048"/>
+            <a:ext cx="5186426" cy="0"/>
+          </a:xfrm>
+          <a:prstGeom prst="line">
+            <a:avLst/>
+          </a:prstGeom>
+          <a:ln w="38100">
+            <a:solidFill>
+              <a:schemeClr val="accent5">
+                <a:lumMod val="60000"/>
+                <a:lumOff val="40000"/>
+              </a:schemeClr>
+            </a:solidFill>
+          </a:ln>
+        </p:spPr>
+        <p:style>
+          <a:lnRef idx="1">
+            <a:schemeClr val="accent1"/>
+          </a:lnRef>
+          <a:fillRef idx="0">
+            <a:schemeClr val="accent1"/>
+          </a:fillRef>
+          <a:effectRef idx="0">
+            <a:schemeClr val="accent1"/>
+          </a:effectRef>
+          <a:fontRef idx="minor">
+            <a:schemeClr val="tx1"/>
+          </a:fontRef>
+        </p:style>
+      </p:cxnSp>
+      <p:cxnSp>
+        <p:nvCxnSpPr>
+          <p:cNvPr id="67" name="Straight Arrow Connector 66">
+            <a:extLst>
+              <a:ext uri="{FF2B5EF4-FFF2-40B4-BE49-F238E27FC236}">
+                <a16:creationId xmlns:a16="http://schemas.microsoft.com/office/drawing/2014/main" id="{5EA1A814-AEA3-F5DA-6744-F8953AAD376E}"/>
+              </a:ext>
+            </a:extLst>
+          </p:cNvPr>
+          <p:cNvCxnSpPr>
+            <a:cxnSpLocks/>
+          </p:cNvCxnSpPr>
+          <p:nvPr/>
+        </p:nvCxnSpPr>
+        <p:spPr>
+          <a:xfrm flipV="1">
+            <a:off x="8498070" y="3200400"/>
+            <a:ext cx="0" cy="635009"/>
+          </a:xfrm>
+          <a:prstGeom prst="straightConnector1">
+            <a:avLst/>
+          </a:prstGeom>
+          <a:ln w="38100">
+            <a:solidFill>
+              <a:schemeClr val="accent5">
+                <a:lumMod val="60000"/>
+                <a:lumOff val="40000"/>
+              </a:schemeClr>
+            </a:solidFill>
+            <a:tailEnd type="triangle"/>
+          </a:ln>
+        </p:spPr>
+        <p:style>
+          <a:lnRef idx="1">
+            <a:schemeClr val="accent1"/>
+          </a:lnRef>
+          <a:fillRef idx="0">
+            <a:schemeClr val="accent1"/>
+          </a:fillRef>
+          <a:effectRef idx="0">
+            <a:schemeClr val="accent1"/>
+          </a:effectRef>
+          <a:fontRef idx="minor">
+            <a:schemeClr val="tx1"/>
+          </a:fontRef>
+        </p:style>
+      </p:cxnSp>
+      <p:cxnSp>
+        <p:nvCxnSpPr>
+          <p:cNvPr id="69" name="Straight Connector 68">
+            <a:extLst>
+              <a:ext uri="{FF2B5EF4-FFF2-40B4-BE49-F238E27FC236}">
+                <a16:creationId xmlns:a16="http://schemas.microsoft.com/office/drawing/2014/main" id="{871EB246-8336-1A89-A6CD-093ED0E13450}"/>
+              </a:ext>
+            </a:extLst>
+          </p:cNvPr>
+          <p:cNvCxnSpPr>
+            <a:cxnSpLocks/>
+          </p:cNvCxnSpPr>
+          <p:nvPr/>
+        </p:nvCxnSpPr>
+        <p:spPr>
+          <a:xfrm>
+            <a:off x="3329328" y="3823774"/>
+            <a:ext cx="0" cy="297611"/>
+          </a:xfrm>
+          <a:prstGeom prst="line">
+            <a:avLst/>
+          </a:prstGeom>
+          <a:ln w="38100">
+            <a:solidFill>
+              <a:schemeClr val="accent5">
+                <a:lumMod val="60000"/>
+                <a:lumOff val="40000"/>
+              </a:schemeClr>
+            </a:solidFill>
+          </a:ln>
+        </p:spPr>
+        <p:style>
+          <a:lnRef idx="1">
+            <a:schemeClr val="accent1"/>
+          </a:lnRef>
+          <a:fillRef idx="0">
+            <a:schemeClr val="accent1"/>
+          </a:fillRef>
+          <a:effectRef idx="0">
+            <a:schemeClr val="accent1"/>
+          </a:effectRef>
+          <a:fontRef idx="minor">
+            <a:schemeClr val="tx1"/>
+          </a:fontRef>
+        </p:style>
+      </p:cxnSp>
+      <p:cxnSp>
+        <p:nvCxnSpPr>
+          <p:cNvPr id="71" name="Straight Connector 70">
+            <a:extLst>
+              <a:ext uri="{FF2B5EF4-FFF2-40B4-BE49-F238E27FC236}">
+                <a16:creationId xmlns:a16="http://schemas.microsoft.com/office/drawing/2014/main" id="{028E47EF-6638-531A-055D-FA9C874B40CB}"/>
+              </a:ext>
+            </a:extLst>
+          </p:cNvPr>
+          <p:cNvCxnSpPr>
+            <a:cxnSpLocks/>
+          </p:cNvCxnSpPr>
+          <p:nvPr/>
+        </p:nvCxnSpPr>
+        <p:spPr>
+          <a:xfrm>
+            <a:off x="1653937" y="3584203"/>
+            <a:ext cx="7190" cy="1964753"/>
+          </a:xfrm>
+          <a:prstGeom prst="line">
+            <a:avLst/>
+          </a:prstGeom>
+          <a:ln w="38100">
+            <a:solidFill>
+              <a:schemeClr val="accent5">
+                <a:lumMod val="60000"/>
+                <a:lumOff val="40000"/>
+              </a:schemeClr>
+            </a:solidFill>
+          </a:ln>
+        </p:spPr>
+        <p:style>
+          <a:lnRef idx="1">
+            <a:schemeClr val="accent1"/>
+          </a:lnRef>
+          <a:fillRef idx="0">
+            <a:schemeClr val="accent1"/>
+          </a:fillRef>
+          <a:effectRef idx="0">
+            <a:schemeClr val="accent1"/>
+          </a:effectRef>
+          <a:fontRef idx="minor">
+            <a:schemeClr val="tx1"/>
+          </a:fontRef>
+        </p:style>
+      </p:cxnSp>
+      <p:cxnSp>
+        <p:nvCxnSpPr>
+          <p:cNvPr id="73" name="Straight Arrow Connector 72">
+            <a:extLst>
+              <a:ext uri="{FF2B5EF4-FFF2-40B4-BE49-F238E27FC236}">
+                <a16:creationId xmlns:a16="http://schemas.microsoft.com/office/drawing/2014/main" id="{D140D526-F566-5617-DD96-549F4EFB0AD1}"/>
+              </a:ext>
+            </a:extLst>
+          </p:cNvPr>
+          <p:cNvCxnSpPr>
+            <a:cxnSpLocks/>
+          </p:cNvCxnSpPr>
+          <p:nvPr/>
+        </p:nvCxnSpPr>
+        <p:spPr>
+          <a:xfrm flipV="1">
+            <a:off x="5332868" y="3200400"/>
+            <a:ext cx="0" cy="399977"/>
+          </a:xfrm>
+          <a:prstGeom prst="straightConnector1">
+            <a:avLst/>
+          </a:prstGeom>
+          <a:ln w="38100">
+            <a:solidFill>
+              <a:schemeClr val="accent5">
+                <a:lumMod val="60000"/>
+                <a:lumOff val="40000"/>
+              </a:schemeClr>
+            </a:solidFill>
+            <a:tailEnd type="triangle"/>
+          </a:ln>
+        </p:spPr>
+        <p:style>
+          <a:lnRef idx="1">
+            <a:schemeClr val="accent1"/>
+          </a:lnRef>
+          <a:fillRef idx="0">
+            <a:schemeClr val="accent1"/>
+          </a:fillRef>
+          <a:effectRef idx="0">
+            <a:schemeClr val="accent1"/>
+          </a:effectRef>
+          <a:fontRef idx="minor">
+            <a:schemeClr val="tx1"/>
+          </a:fontRef>
+        </p:style>
+      </p:cxnSp>
+      <p:cxnSp>
+        <p:nvCxnSpPr>
+          <p:cNvPr id="89" name="Straight Connector 88">
+            <a:extLst>
+              <a:ext uri="{FF2B5EF4-FFF2-40B4-BE49-F238E27FC236}">
+                <a16:creationId xmlns:a16="http://schemas.microsoft.com/office/drawing/2014/main" id="{70B1787C-7C7D-0272-66C1-108D770355F7}"/>
+              </a:ext>
+            </a:extLst>
+          </p:cNvPr>
+          <p:cNvCxnSpPr>
+            <a:cxnSpLocks/>
+          </p:cNvCxnSpPr>
+          <p:nvPr/>
+        </p:nvCxnSpPr>
+        <p:spPr>
+          <a:xfrm>
+            <a:off x="1967735" y="4894628"/>
+            <a:ext cx="2173857" cy="0"/>
+          </a:xfrm>
+          <a:prstGeom prst="line">
+            <a:avLst/>
+          </a:prstGeom>
+          <a:ln w="38100">
+            <a:solidFill>
+              <a:srgbClr val="F19B61"/>
+            </a:solidFill>
+          </a:ln>
+        </p:spPr>
+        <p:style>
+          <a:lnRef idx="1">
+            <a:schemeClr val="accent1"/>
+          </a:lnRef>
+          <a:fillRef idx="0">
+            <a:schemeClr val="accent1"/>
+          </a:fillRef>
+          <a:effectRef idx="0">
+            <a:schemeClr val="accent1"/>
+          </a:effectRef>
+          <a:fontRef idx="minor">
+            <a:schemeClr val="tx1"/>
+          </a:fontRef>
+        </p:style>
+      </p:cxnSp>
+      <p:cxnSp>
+        <p:nvCxnSpPr>
+          <p:cNvPr id="91" name="Straight Arrow Connector 90">
+            <a:extLst>
+              <a:ext uri="{FF2B5EF4-FFF2-40B4-BE49-F238E27FC236}">
+                <a16:creationId xmlns:a16="http://schemas.microsoft.com/office/drawing/2014/main" id="{8CD40417-B4C5-8DCB-CE0F-400952F482AE}"/>
+              </a:ext>
+            </a:extLst>
+          </p:cNvPr>
+          <p:cNvCxnSpPr>
+            <a:cxnSpLocks/>
+          </p:cNvCxnSpPr>
+          <p:nvPr/>
+        </p:nvCxnSpPr>
+        <p:spPr>
+          <a:xfrm>
+            <a:off x="4114271" y="4465435"/>
+            <a:ext cx="341464" cy="0"/>
+          </a:xfrm>
+          <a:prstGeom prst="straightConnector1">
+            <a:avLst/>
+          </a:prstGeom>
+          <a:ln w="38100">
+            <a:solidFill>
+              <a:srgbClr val="F19B61"/>
+            </a:solidFill>
+            <a:tailEnd type="triangle"/>
+          </a:ln>
+        </p:spPr>
+        <p:style>
+          <a:lnRef idx="1">
+            <a:schemeClr val="accent1"/>
+          </a:lnRef>
+          <a:fillRef idx="0">
+            <a:schemeClr val="accent1"/>
+          </a:fillRef>
+          <a:effectRef idx="0">
+            <a:schemeClr val="accent1"/>
+          </a:effectRef>
+          <a:fontRef idx="minor">
+            <a:schemeClr val="tx1"/>
+          </a:fontRef>
+        </p:style>
+      </p:cxnSp>
+      <p:cxnSp>
+        <p:nvCxnSpPr>
+          <p:cNvPr id="98" name="Straight Connector 97">
+            <a:extLst>
+              <a:ext uri="{FF2B5EF4-FFF2-40B4-BE49-F238E27FC236}">
+                <a16:creationId xmlns:a16="http://schemas.microsoft.com/office/drawing/2014/main" id="{3D2D2A05-6B04-52CF-9085-FE0C04D5DAC0}"/>
+              </a:ext>
+            </a:extLst>
+          </p:cNvPr>
+          <p:cNvCxnSpPr>
+            <a:cxnSpLocks/>
+          </p:cNvCxnSpPr>
+          <p:nvPr/>
+        </p:nvCxnSpPr>
+        <p:spPr>
+          <a:xfrm>
+            <a:off x="4129511" y="4465435"/>
+            <a:ext cx="0" cy="438509"/>
+          </a:xfrm>
+          <a:prstGeom prst="line">
+            <a:avLst/>
+          </a:prstGeom>
+          <a:ln w="38100">
+            <a:solidFill>
+              <a:srgbClr val="F19B61"/>
+            </a:solidFill>
+          </a:ln>
+        </p:spPr>
+        <p:style>
+          <a:lnRef idx="1">
+            <a:schemeClr val="accent1"/>
+          </a:lnRef>
+          <a:fillRef idx="0">
+            <a:schemeClr val="accent1"/>
+          </a:fillRef>
+          <a:effectRef idx="0">
+            <a:schemeClr val="accent1"/>
+          </a:effectRef>
+          <a:fontRef idx="minor">
+            <a:schemeClr val="tx1"/>
+          </a:fontRef>
+        </p:style>
+      </p:cxnSp>
+      <p:cxnSp>
+        <p:nvCxnSpPr>
+          <p:cNvPr id="106" name="Straight Connector 105">
+            <a:extLst>
+              <a:ext uri="{FF2B5EF4-FFF2-40B4-BE49-F238E27FC236}">
+                <a16:creationId xmlns:a16="http://schemas.microsoft.com/office/drawing/2014/main" id="{12D5F56E-3FCD-C0F9-9BC5-4DCB8584E3CD}"/>
+              </a:ext>
+            </a:extLst>
+          </p:cNvPr>
+          <p:cNvCxnSpPr>
+            <a:cxnSpLocks/>
+          </p:cNvCxnSpPr>
+          <p:nvPr/>
+        </p:nvCxnSpPr>
+        <p:spPr>
+          <a:xfrm>
+            <a:off x="1825541" y="5047028"/>
+            <a:ext cx="3968146" cy="10556"/>
+          </a:xfrm>
+          <a:prstGeom prst="line">
+            <a:avLst/>
+          </a:prstGeom>
+          <a:ln w="38100">
+            <a:solidFill>
+              <a:srgbClr val="B482DA"/>
+            </a:solidFill>
+          </a:ln>
+        </p:spPr>
+        <p:style>
+          <a:lnRef idx="1">
+            <a:schemeClr val="accent1"/>
+          </a:lnRef>
+          <a:fillRef idx="0">
+            <a:schemeClr val="accent1"/>
+          </a:fillRef>
+          <a:effectRef idx="0">
+            <a:schemeClr val="accent1"/>
+          </a:effectRef>
+          <a:fontRef idx="minor">
+            <a:schemeClr val="tx1"/>
+          </a:fontRef>
+        </p:style>
+      </p:cxnSp>
+      <p:cxnSp>
+        <p:nvCxnSpPr>
+          <p:cNvPr id="112" name="Straight Arrow Connector 111">
+            <a:extLst>
+              <a:ext uri="{FF2B5EF4-FFF2-40B4-BE49-F238E27FC236}">
+                <a16:creationId xmlns:a16="http://schemas.microsoft.com/office/drawing/2014/main" id="{27DF6E25-EDEF-BB59-B518-41A9A72B1499}"/>
+              </a:ext>
+            </a:extLst>
+          </p:cNvPr>
+          <p:cNvCxnSpPr>
+            <a:cxnSpLocks/>
+          </p:cNvCxnSpPr>
+          <p:nvPr/>
+        </p:nvCxnSpPr>
+        <p:spPr>
+          <a:xfrm flipV="1">
+            <a:off x="1818985" y="3268549"/>
+            <a:ext cx="6556" cy="1783242"/>
+          </a:xfrm>
+          <a:prstGeom prst="straightConnector1">
+            <a:avLst/>
+          </a:prstGeom>
+          <a:ln w="38100">
+            <a:solidFill>
+              <a:srgbClr val="B482DA"/>
+            </a:solidFill>
+            <a:tailEnd type="triangle"/>
+          </a:ln>
+        </p:spPr>
+        <p:style>
+          <a:lnRef idx="1">
+            <a:schemeClr val="accent1"/>
+          </a:lnRef>
+          <a:fillRef idx="0">
+            <a:schemeClr val="accent1"/>
+          </a:fillRef>
+          <a:effectRef idx="0">
+            <a:schemeClr val="accent1"/>
+          </a:effectRef>
+          <a:fontRef idx="minor">
+            <a:schemeClr val="tx1"/>
+          </a:fontRef>
+        </p:style>
+      </p:cxnSp>
+      <p:cxnSp>
+        <p:nvCxnSpPr>
+          <p:cNvPr id="117" name="Straight Connector 116">
+            <a:extLst>
+              <a:ext uri="{FF2B5EF4-FFF2-40B4-BE49-F238E27FC236}">
+                <a16:creationId xmlns:a16="http://schemas.microsoft.com/office/drawing/2014/main" id="{EEBC622F-41DF-4D24-314A-1D701108F987}"/>
+              </a:ext>
+            </a:extLst>
+          </p:cNvPr>
+          <p:cNvCxnSpPr>
+            <a:cxnSpLocks/>
+          </p:cNvCxnSpPr>
+          <p:nvPr/>
+        </p:nvCxnSpPr>
+        <p:spPr>
+          <a:xfrm>
+            <a:off x="4205280" y="5039408"/>
+            <a:ext cx="0" cy="494308"/>
+          </a:xfrm>
+          <a:prstGeom prst="line">
+            <a:avLst/>
+          </a:prstGeom>
+          <a:ln w="38100">
+            <a:solidFill>
+              <a:srgbClr val="B482DA"/>
+            </a:solidFill>
+          </a:ln>
+        </p:spPr>
+        <p:style>
+          <a:lnRef idx="1">
+            <a:schemeClr val="accent1"/>
+          </a:lnRef>
+          <a:fillRef idx="0">
+            <a:schemeClr val="accent1"/>
+          </a:fillRef>
+          <a:effectRef idx="0">
+            <a:schemeClr val="accent1"/>
+          </a:effectRef>
+          <a:fontRef idx="minor">
+            <a:schemeClr val="tx1"/>
+          </a:fontRef>
+        </p:style>
+      </p:cxnSp>
+      <p:cxnSp>
+        <p:nvCxnSpPr>
+          <p:cNvPr id="121" name="Straight Connector 120">
+            <a:extLst>
+              <a:ext uri="{FF2B5EF4-FFF2-40B4-BE49-F238E27FC236}">
+                <a16:creationId xmlns:a16="http://schemas.microsoft.com/office/drawing/2014/main" id="{5D935756-21DE-4CFD-A1FE-5FF1008107A8}"/>
+              </a:ext>
+            </a:extLst>
+          </p:cNvPr>
+          <p:cNvCxnSpPr>
+            <a:cxnSpLocks/>
+          </p:cNvCxnSpPr>
+          <p:nvPr/>
+        </p:nvCxnSpPr>
+        <p:spPr>
+          <a:xfrm>
+            <a:off x="5793687" y="5039408"/>
+            <a:ext cx="0" cy="494308"/>
+          </a:xfrm>
+          <a:prstGeom prst="line">
+            <a:avLst/>
+          </a:prstGeom>
+          <a:ln w="38100">
+            <a:solidFill>
+              <a:srgbClr val="B482DA"/>
+            </a:solidFill>
+          </a:ln>
+        </p:spPr>
+        <p:style>
+          <a:lnRef idx="1">
+            <a:schemeClr val="accent1"/>
+          </a:lnRef>
+          <a:fillRef idx="0">
+            <a:schemeClr val="accent1"/>
+          </a:fillRef>
+          <a:effectRef idx="0">
+            <a:schemeClr val="accent1"/>
+          </a:effectRef>
+          <a:fontRef idx="minor">
+            <a:schemeClr val="tx1"/>
+          </a:fontRef>
+        </p:style>
+      </p:cxnSp>
+      <p:cxnSp>
+        <p:nvCxnSpPr>
+          <p:cNvPr id="122" name="Straight Connector 121">
+            <a:extLst>
+              <a:ext uri="{FF2B5EF4-FFF2-40B4-BE49-F238E27FC236}">
+                <a16:creationId xmlns:a16="http://schemas.microsoft.com/office/drawing/2014/main" id="{20210676-8663-0A94-8933-A6B5B4D45CDD}"/>
+              </a:ext>
+            </a:extLst>
+          </p:cNvPr>
+          <p:cNvCxnSpPr>
+            <a:cxnSpLocks/>
+          </p:cNvCxnSpPr>
+          <p:nvPr/>
+        </p:nvCxnSpPr>
+        <p:spPr>
+          <a:xfrm>
+            <a:off x="3949363" y="3408027"/>
+            <a:ext cx="1085493" cy="0"/>
+          </a:xfrm>
+          <a:prstGeom prst="line">
+            <a:avLst/>
+          </a:prstGeom>
+          <a:ln w="38100">
+            <a:solidFill>
+              <a:srgbClr val="F19B61"/>
+            </a:solidFill>
+          </a:ln>
+        </p:spPr>
+        <p:style>
+          <a:lnRef idx="1">
+            <a:schemeClr val="accent1"/>
+          </a:lnRef>
+          <a:fillRef idx="0">
+            <a:schemeClr val="accent1"/>
+          </a:fillRef>
+          <a:effectRef idx="0">
+            <a:schemeClr val="accent1"/>
+          </a:effectRef>
+          <a:fontRef idx="minor">
+            <a:schemeClr val="tx1"/>
+          </a:fontRef>
+        </p:style>
+      </p:cxnSp>
+      <p:cxnSp>
+        <p:nvCxnSpPr>
+          <p:cNvPr id="123" name="Straight Connector 122">
+            <a:extLst>
+              <a:ext uri="{FF2B5EF4-FFF2-40B4-BE49-F238E27FC236}">
+                <a16:creationId xmlns:a16="http://schemas.microsoft.com/office/drawing/2014/main" id="{E9D643AF-3B8B-32DC-C1BE-F8F72CE95538}"/>
+              </a:ext>
+            </a:extLst>
+          </p:cNvPr>
+          <p:cNvCxnSpPr>
+            <a:cxnSpLocks/>
+          </p:cNvCxnSpPr>
+          <p:nvPr/>
+        </p:nvCxnSpPr>
+        <p:spPr>
+          <a:xfrm>
+            <a:off x="3950943" y="3228148"/>
+            <a:ext cx="0" cy="192197"/>
+          </a:xfrm>
+          <a:prstGeom prst="line">
+            <a:avLst/>
+          </a:prstGeom>
+          <a:ln w="38100">
+            <a:solidFill>
+              <a:srgbClr val="F19B61"/>
+            </a:solidFill>
+          </a:ln>
+        </p:spPr>
+        <p:style>
+          <a:lnRef idx="1">
+            <a:schemeClr val="accent1"/>
+          </a:lnRef>
+          <a:fillRef idx="0">
+            <a:schemeClr val="accent1"/>
+          </a:fillRef>
+          <a:effectRef idx="0">
+            <a:schemeClr val="accent1"/>
+          </a:effectRef>
+          <a:fontRef idx="minor">
+            <a:schemeClr val="tx1"/>
+          </a:fontRef>
+        </p:style>
+      </p:cxnSp>
+      <p:cxnSp>
+        <p:nvCxnSpPr>
+          <p:cNvPr id="126" name="Straight Arrow Connector 125">
+            <a:extLst>
+              <a:ext uri="{FF2B5EF4-FFF2-40B4-BE49-F238E27FC236}">
+                <a16:creationId xmlns:a16="http://schemas.microsoft.com/office/drawing/2014/main" id="{791B4042-8870-95F0-191E-57B049794494}"/>
+              </a:ext>
+            </a:extLst>
+          </p:cNvPr>
+          <p:cNvCxnSpPr>
+            <a:cxnSpLocks/>
+          </p:cNvCxnSpPr>
+          <p:nvPr/>
+        </p:nvCxnSpPr>
+        <p:spPr>
+          <a:xfrm>
+            <a:off x="5034856" y="3392768"/>
+            <a:ext cx="0" cy="775022"/>
+          </a:xfrm>
+          <a:prstGeom prst="straightConnector1">
+            <a:avLst/>
+          </a:prstGeom>
+          <a:ln w="38100">
+            <a:solidFill>
+              <a:srgbClr val="F19B61"/>
+            </a:solidFill>
+            <a:tailEnd type="triangle"/>
+          </a:ln>
+        </p:spPr>
+        <p:style>
+          <a:lnRef idx="1">
+            <a:schemeClr val="accent1"/>
+          </a:lnRef>
+          <a:fillRef idx="0">
+            <a:schemeClr val="accent1"/>
+          </a:fillRef>
+          <a:effectRef idx="0">
+            <a:schemeClr val="accent1"/>
+          </a:effectRef>
+          <a:fontRef idx="minor">
+            <a:schemeClr val="tx1"/>
+          </a:fontRef>
+        </p:style>
+      </p:cxnSp>
+      <p:cxnSp>
+        <p:nvCxnSpPr>
+          <p:cNvPr id="130" name="Straight Connector 129">
+            <a:extLst>
+              <a:ext uri="{FF2B5EF4-FFF2-40B4-BE49-F238E27FC236}">
+                <a16:creationId xmlns:a16="http://schemas.microsoft.com/office/drawing/2014/main" id="{F0FBA42B-84B4-482F-DAAC-2CC4A987499F}"/>
+              </a:ext>
+            </a:extLst>
+          </p:cNvPr>
+          <p:cNvCxnSpPr>
+            <a:cxnSpLocks/>
+          </p:cNvCxnSpPr>
+          <p:nvPr/>
+        </p:nvCxnSpPr>
+        <p:spPr>
+          <a:xfrm>
+            <a:off x="5516268" y="3835409"/>
+            <a:ext cx="0" cy="297611"/>
+          </a:xfrm>
+          <a:prstGeom prst="line">
+            <a:avLst/>
+          </a:prstGeom>
+          <a:ln w="38100">
+            <a:solidFill>
+              <a:schemeClr val="accent5">
+                <a:lumMod val="60000"/>
+                <a:lumOff val="40000"/>
+              </a:schemeClr>
+            </a:solidFill>
+          </a:ln>
+        </p:spPr>
+        <p:style>
+          <a:lnRef idx="1">
+            <a:schemeClr val="accent1"/>
+          </a:lnRef>
+          <a:fillRef idx="0">
+            <a:schemeClr val="accent1"/>
+          </a:fillRef>
+          <a:effectRef idx="0">
+            <a:schemeClr val="accent1"/>
+          </a:effectRef>
+          <a:fontRef idx="minor">
+            <a:schemeClr val="tx1"/>
+          </a:fontRef>
+        </p:style>
+      </p:cxnSp>
     </p:spTree>
     <p:extLst>
       <p:ext uri="{BB962C8B-B14F-4D97-AF65-F5344CB8AC3E}">
@@ -4589,10 +5926,7 @@
             <a:avLst/>
           </a:prstGeom>
           <a:solidFill>
-            <a:schemeClr val="accent2">
-              <a:lumMod val="60000"/>
-              <a:lumOff val="40000"/>
-            </a:schemeClr>
+            <a:srgbClr val="F19B61"/>
           </a:solidFill>
           <a:ln w="28575">
             <a:solidFill>
@@ -4899,6 +6233,196 @@
             <a:r>
               <a:rPr lang="es-ES" sz="2000" dirty="0"/>
               <a:t>PROTECTED OBJ</a:t>
+            </a:r>
+          </a:p>
+        </p:txBody>
+      </p:sp>
+      <p:sp>
+        <p:nvSpPr>
+          <p:cNvPr id="2" name="Rectangle 1">
+            <a:extLst>
+              <a:ext uri="{FF2B5EF4-FFF2-40B4-BE49-F238E27FC236}">
+                <a16:creationId xmlns:a16="http://schemas.microsoft.com/office/drawing/2014/main" id="{8BBFF40A-7D38-2DF0-15E8-CC51249B5D43}"/>
+              </a:ext>
+            </a:extLst>
+          </p:cNvPr>
+          <p:cNvSpPr/>
+          <p:nvPr/>
+        </p:nvSpPr>
+        <p:spPr>
+          <a:xfrm>
+            <a:off x="595222" y="3642879"/>
+            <a:ext cx="439947" cy="431321"/>
+          </a:xfrm>
+          <a:prstGeom prst="rect">
+            <a:avLst/>
+          </a:prstGeom>
+          <a:solidFill>
+            <a:srgbClr val="B482DA"/>
+          </a:solidFill>
+          <a:ln w="28575">
+            <a:solidFill>
+              <a:schemeClr val="tx1"/>
+            </a:solidFill>
+          </a:ln>
+        </p:spPr>
+        <p:style>
+          <a:lnRef idx="2">
+            <a:schemeClr val="accent1">
+              <a:shade val="15000"/>
+            </a:schemeClr>
+          </a:lnRef>
+          <a:fillRef idx="1">
+            <a:schemeClr val="accent1"/>
+          </a:fillRef>
+          <a:effectRef idx="0">
+            <a:schemeClr val="accent1"/>
+          </a:effectRef>
+          <a:fontRef idx="minor">
+            <a:schemeClr val="lt1"/>
+          </a:fontRef>
+        </p:style>
+        <p:txBody>
+          <a:bodyPr rtlCol="0" anchor="ctr"/>
+          <a:lstStyle/>
+          <a:p>
+            <a:pPr algn="ctr"/>
+            <a:endParaRPr lang="es-ES"/>
+          </a:p>
+        </p:txBody>
+      </p:sp>
+      <p:sp>
+        <p:nvSpPr>
+          <p:cNvPr id="3" name="Rectangle 2">
+            <a:extLst>
+              <a:ext uri="{FF2B5EF4-FFF2-40B4-BE49-F238E27FC236}">
+                <a16:creationId xmlns:a16="http://schemas.microsoft.com/office/drawing/2014/main" id="{C2A844CD-9671-9E49-9DA5-4EC664297BC1}"/>
+              </a:ext>
+            </a:extLst>
+          </p:cNvPr>
+          <p:cNvSpPr/>
+          <p:nvPr/>
+        </p:nvSpPr>
+        <p:spPr>
+          <a:xfrm>
+            <a:off x="595221" y="4270827"/>
+            <a:ext cx="439947" cy="431321"/>
+          </a:xfrm>
+          <a:prstGeom prst="rect">
+            <a:avLst/>
+          </a:prstGeom>
+          <a:solidFill>
+            <a:srgbClr val="EEAAAA"/>
+          </a:solidFill>
+          <a:ln w="28575">
+            <a:solidFill>
+              <a:schemeClr val="tx1"/>
+            </a:solidFill>
+          </a:ln>
+        </p:spPr>
+        <p:style>
+          <a:lnRef idx="2">
+            <a:schemeClr val="accent1">
+              <a:shade val="15000"/>
+            </a:schemeClr>
+          </a:lnRef>
+          <a:fillRef idx="1">
+            <a:schemeClr val="accent1"/>
+          </a:fillRef>
+          <a:effectRef idx="0">
+            <a:schemeClr val="accent1"/>
+          </a:effectRef>
+          <a:fontRef idx="minor">
+            <a:schemeClr val="lt1"/>
+          </a:fontRef>
+        </p:style>
+        <p:txBody>
+          <a:bodyPr rtlCol="0" anchor="ctr"/>
+          <a:lstStyle/>
+          <a:p>
+            <a:pPr algn="ctr"/>
+            <a:endParaRPr lang="es-ES"/>
+          </a:p>
+        </p:txBody>
+      </p:sp>
+      <p:sp>
+        <p:nvSpPr>
+          <p:cNvPr id="9" name="TextBox 8">
+            <a:extLst>
+              <a:ext uri="{FF2B5EF4-FFF2-40B4-BE49-F238E27FC236}">
+                <a16:creationId xmlns:a16="http://schemas.microsoft.com/office/drawing/2014/main" id="{FC215A90-990D-9EE1-2569-8412F2FD2CAD}"/>
+              </a:ext>
+            </a:extLst>
+          </p:cNvPr>
+          <p:cNvSpPr txBox="1"/>
+          <p:nvPr/>
+        </p:nvSpPr>
+        <p:spPr>
+          <a:xfrm>
+            <a:off x="1204823" y="3658484"/>
+            <a:ext cx="1857554" cy="400110"/>
+          </a:xfrm>
+          <a:prstGeom prst="rect">
+            <a:avLst/>
+          </a:prstGeom>
+          <a:noFill/>
+          <a:ln w="28575">
+            <a:solidFill>
+              <a:schemeClr val="tx1"/>
+            </a:solidFill>
+          </a:ln>
+        </p:spPr>
+        <p:txBody>
+          <a:bodyPr wrap="square" rtlCol="0">
+            <a:spAutoFit/>
+          </a:bodyPr>
+          <a:lstStyle/>
+          <a:p>
+            <a:pPr algn="ctr"/>
+            <a:r>
+              <a:rPr lang="es-ES" sz="2000" dirty="0"/>
+              <a:t>HW SENSORS</a:t>
+            </a:r>
+          </a:p>
+        </p:txBody>
+      </p:sp>
+      <p:sp>
+        <p:nvSpPr>
+          <p:cNvPr id="14" name="TextBox 13">
+            <a:extLst>
+              <a:ext uri="{FF2B5EF4-FFF2-40B4-BE49-F238E27FC236}">
+                <a16:creationId xmlns:a16="http://schemas.microsoft.com/office/drawing/2014/main" id="{9B2596F4-762A-C07E-FE0F-8CCD813AECD6}"/>
+              </a:ext>
+            </a:extLst>
+          </p:cNvPr>
+          <p:cNvSpPr txBox="1"/>
+          <p:nvPr/>
+        </p:nvSpPr>
+        <p:spPr>
+          <a:xfrm>
+            <a:off x="1204823" y="4286432"/>
+            <a:ext cx="1857554" cy="400110"/>
+          </a:xfrm>
+          <a:prstGeom prst="rect">
+            <a:avLst/>
+          </a:prstGeom>
+          <a:noFill/>
+          <a:ln w="28575">
+            <a:solidFill>
+              <a:schemeClr val="tx1"/>
+            </a:solidFill>
+          </a:ln>
+        </p:spPr>
+        <p:txBody>
+          <a:bodyPr wrap="square" rtlCol="0">
+            <a:spAutoFit/>
+          </a:bodyPr>
+          <a:lstStyle/>
+          <a:p>
+            <a:pPr algn="ctr"/>
+            <a:r>
+              <a:rPr lang="es-ES" sz="2000" dirty="0"/>
+              <a:t>HW SENSORS</a:t>
             </a:r>
           </a:p>
         </p:txBody>

</xml_diff>